<commit_message>
Add graph example to matrices
</commit_message>
<xml_diff>
--- a/halozatok/Load-Optimal Local Fast Rerouting for Relisient Networks.pptx
+++ b/halozatok/Load-Optimal Local Fast Rerouting for Relisient Networks.pptx
@@ -4041,8 +4041,8 @@
           <a:chExt cx="0" cy="0"/>
         </a:xfrm>
       </p:grpSpPr>
-      <mc:AlternateContent xmlns:mc="http://schemas.openxmlformats.org/markup-compatibility/2006">
-        <mc:Choice xmlns:a14="http://schemas.microsoft.com/office/drawing/2010/main" Requires="a14">
+      <mc:AlternateContent xmlns:mc="http://schemas.openxmlformats.org/markup-compatibility/2006" xmlns:a14="http://schemas.microsoft.com/office/drawing/2010/main">
+        <mc:Choice Requires="a14">
           <p:sp>
             <p:nvSpPr>
               <p:cNvPr id="5" name="Téglalap 4"/>
@@ -4313,7 +4313,7 @@
             </p:txBody>
           </p:sp>
         </mc:Choice>
-        <mc:Fallback>
+        <mc:Fallback xmlns="">
           <p:sp>
             <p:nvSpPr>
               <p:cNvPr id="5" name="Téglalap 4"/>
@@ -4352,8 +4352,8 @@
           </p:sp>
         </mc:Fallback>
       </mc:AlternateContent>
-      <mc:AlternateContent xmlns:mc="http://schemas.openxmlformats.org/markup-compatibility/2006">
-        <mc:Choice xmlns:a14="http://schemas.microsoft.com/office/drawing/2010/main" Requires="a14">
+      <mc:AlternateContent xmlns:mc="http://schemas.openxmlformats.org/markup-compatibility/2006" xmlns:a14="http://schemas.microsoft.com/office/drawing/2010/main">
+        <mc:Choice Requires="a14">
           <p:sp>
             <p:nvSpPr>
               <p:cNvPr id="7" name="Téglalap 6"/>
@@ -4624,7 +4624,7 @@
             </p:txBody>
           </p:sp>
         </mc:Choice>
-        <mc:Fallback>
+        <mc:Fallback xmlns="">
           <p:sp>
             <p:nvSpPr>
               <p:cNvPr id="7" name="Téglalap 6"/>
@@ -4952,6 +4952,1495 @@
           </a:p>
         </p:txBody>
       </p:sp>
+      <p:sp>
+        <p:nvSpPr>
+          <p:cNvPr id="12" name="Ellipszis 11">
+            <a:extLst>
+              <a:ext uri="{FF2B5EF4-FFF2-40B4-BE49-F238E27FC236}">
+                <a16:creationId xmlns:a16="http://schemas.microsoft.com/office/drawing/2014/main" id="{0138D184-EAE7-4932-9655-5EB8D5501AA1}"/>
+              </a:ext>
+            </a:extLst>
+          </p:cNvPr>
+          <p:cNvSpPr/>
+          <p:nvPr/>
+        </p:nvSpPr>
+        <p:spPr>
+          <a:xfrm>
+            <a:off x="6233573" y="3523122"/>
+            <a:ext cx="421894" cy="390245"/>
+          </a:xfrm>
+          <a:prstGeom prst="ellipse">
+            <a:avLst/>
+          </a:prstGeom>
+          <a:solidFill>
+            <a:schemeClr val="bg1"/>
+          </a:solidFill>
+        </p:spPr>
+        <p:style>
+          <a:lnRef idx="2">
+            <a:schemeClr val="accent1">
+              <a:shade val="50000"/>
+            </a:schemeClr>
+          </a:lnRef>
+          <a:fillRef idx="1">
+            <a:schemeClr val="accent1"/>
+          </a:fillRef>
+          <a:effectRef idx="0">
+            <a:schemeClr val="accent1"/>
+          </a:effectRef>
+          <a:fontRef idx="minor">
+            <a:schemeClr val="lt1"/>
+          </a:fontRef>
+        </p:style>
+        <p:txBody>
+          <a:bodyPr rtlCol="0" anchor="ctr"/>
+          <a:lstStyle/>
+          <a:p>
+            <a:pPr algn="ctr"/>
+            <a:r>
+              <a:rPr lang="hu-HU" dirty="0">
+                <a:ln w="0"/>
+                <a:solidFill>
+                  <a:schemeClr val="tx1"/>
+                </a:solidFill>
+                <a:effectLst>
+                  <a:outerShdw blurRad="38100" dist="19050" dir="2700000" algn="tl" rotWithShape="0">
+                    <a:schemeClr val="dk1">
+                      <a:alpha val="40000"/>
+                    </a:schemeClr>
+                  </a:outerShdw>
+                </a:effectLst>
+              </a:rPr>
+              <a:t>1</a:t>
+            </a:r>
+          </a:p>
+        </p:txBody>
+      </p:sp>
+      <p:sp>
+        <p:nvSpPr>
+          <p:cNvPr id="13" name="Ellipszis 12">
+            <a:extLst>
+              <a:ext uri="{FF2B5EF4-FFF2-40B4-BE49-F238E27FC236}">
+                <a16:creationId xmlns:a16="http://schemas.microsoft.com/office/drawing/2014/main" id="{CFEE2F05-9431-410F-8D13-3B50D44FCC98}"/>
+              </a:ext>
+            </a:extLst>
+          </p:cNvPr>
+          <p:cNvSpPr/>
+          <p:nvPr/>
+        </p:nvSpPr>
+        <p:spPr>
+          <a:xfrm>
+            <a:off x="5319698" y="4919068"/>
+            <a:ext cx="421894" cy="419553"/>
+          </a:xfrm>
+          <a:prstGeom prst="ellipse">
+            <a:avLst/>
+          </a:prstGeom>
+          <a:solidFill>
+            <a:schemeClr val="bg1"/>
+          </a:solidFill>
+        </p:spPr>
+        <p:style>
+          <a:lnRef idx="2">
+            <a:schemeClr val="accent1">
+              <a:shade val="50000"/>
+            </a:schemeClr>
+          </a:lnRef>
+          <a:fillRef idx="1">
+            <a:schemeClr val="accent1"/>
+          </a:fillRef>
+          <a:effectRef idx="0">
+            <a:schemeClr val="accent1"/>
+          </a:effectRef>
+          <a:fontRef idx="minor">
+            <a:schemeClr val="lt1"/>
+          </a:fontRef>
+        </p:style>
+        <p:txBody>
+          <a:bodyPr rtlCol="0" anchor="ctr"/>
+          <a:lstStyle/>
+          <a:p>
+            <a:pPr algn="ctr"/>
+            <a:r>
+              <a:rPr lang="hu-HU" dirty="0">
+                <a:ln w="0"/>
+                <a:solidFill>
+                  <a:schemeClr val="tx1"/>
+                </a:solidFill>
+                <a:effectLst>
+                  <a:outerShdw blurRad="38100" dist="19050" dir="2700000" algn="tl" rotWithShape="0">
+                    <a:schemeClr val="dk1">
+                      <a:alpha val="40000"/>
+                    </a:schemeClr>
+                  </a:outerShdw>
+                </a:effectLst>
+              </a:rPr>
+              <a:t>5</a:t>
+            </a:r>
+          </a:p>
+        </p:txBody>
+      </p:sp>
+      <p:sp>
+        <p:nvSpPr>
+          <p:cNvPr id="14" name="Ellipszis 13">
+            <a:extLst>
+              <a:ext uri="{FF2B5EF4-FFF2-40B4-BE49-F238E27FC236}">
+                <a16:creationId xmlns:a16="http://schemas.microsoft.com/office/drawing/2014/main" id="{B48B6676-20B7-46D6-A45A-4F3DBD71A82C}"/>
+              </a:ext>
+            </a:extLst>
+          </p:cNvPr>
+          <p:cNvSpPr/>
+          <p:nvPr/>
+        </p:nvSpPr>
+        <p:spPr>
+          <a:xfrm>
+            <a:off x="6233573" y="5390048"/>
+            <a:ext cx="421894" cy="419553"/>
+          </a:xfrm>
+          <a:prstGeom prst="ellipse">
+            <a:avLst/>
+          </a:prstGeom>
+          <a:solidFill>
+            <a:schemeClr val="bg1"/>
+          </a:solidFill>
+        </p:spPr>
+        <p:style>
+          <a:lnRef idx="2">
+            <a:schemeClr val="accent1">
+              <a:shade val="50000"/>
+            </a:schemeClr>
+          </a:lnRef>
+          <a:fillRef idx="1">
+            <a:schemeClr val="accent1"/>
+          </a:fillRef>
+          <a:effectRef idx="0">
+            <a:schemeClr val="accent1"/>
+          </a:effectRef>
+          <a:fontRef idx="minor">
+            <a:schemeClr val="lt1"/>
+          </a:fontRef>
+        </p:style>
+        <p:txBody>
+          <a:bodyPr rtlCol="0" anchor="ctr"/>
+          <a:lstStyle/>
+          <a:p>
+            <a:pPr algn="ctr"/>
+            <a:r>
+              <a:rPr lang="hu-HU" dirty="0">
+                <a:ln w="0"/>
+                <a:solidFill>
+                  <a:schemeClr val="tx1"/>
+                </a:solidFill>
+                <a:effectLst>
+                  <a:outerShdw blurRad="38100" dist="19050" dir="2700000" algn="tl" rotWithShape="0">
+                    <a:schemeClr val="dk1">
+                      <a:alpha val="40000"/>
+                    </a:schemeClr>
+                  </a:outerShdw>
+                </a:effectLst>
+              </a:rPr>
+              <a:t>4</a:t>
+            </a:r>
+          </a:p>
+        </p:txBody>
+      </p:sp>
+      <p:sp>
+        <p:nvSpPr>
+          <p:cNvPr id="15" name="Ellipszis 14">
+            <a:extLst>
+              <a:ext uri="{FF2B5EF4-FFF2-40B4-BE49-F238E27FC236}">
+                <a16:creationId xmlns:a16="http://schemas.microsoft.com/office/drawing/2014/main" id="{FA424EC2-8238-47EA-9D50-3EE05A09DE91}"/>
+              </a:ext>
+            </a:extLst>
+          </p:cNvPr>
+          <p:cNvSpPr/>
+          <p:nvPr/>
+        </p:nvSpPr>
+        <p:spPr>
+          <a:xfrm>
+            <a:off x="7183211" y="4919067"/>
+            <a:ext cx="421894" cy="419553"/>
+          </a:xfrm>
+          <a:prstGeom prst="ellipse">
+            <a:avLst/>
+          </a:prstGeom>
+          <a:solidFill>
+            <a:schemeClr val="bg1"/>
+          </a:solidFill>
+        </p:spPr>
+        <p:style>
+          <a:lnRef idx="2">
+            <a:schemeClr val="accent1">
+              <a:shade val="50000"/>
+            </a:schemeClr>
+          </a:lnRef>
+          <a:fillRef idx="1">
+            <a:schemeClr val="accent1"/>
+          </a:fillRef>
+          <a:effectRef idx="0">
+            <a:schemeClr val="accent1"/>
+          </a:effectRef>
+          <a:fontRef idx="minor">
+            <a:schemeClr val="lt1"/>
+          </a:fontRef>
+        </p:style>
+        <p:txBody>
+          <a:bodyPr rtlCol="0" anchor="ctr"/>
+          <a:lstStyle/>
+          <a:p>
+            <a:pPr algn="ctr"/>
+            <a:r>
+              <a:rPr lang="hu-HU" dirty="0">
+                <a:ln w="0"/>
+                <a:solidFill>
+                  <a:schemeClr val="tx1"/>
+                </a:solidFill>
+                <a:effectLst>
+                  <a:outerShdw blurRad="38100" dist="19050" dir="2700000" algn="tl" rotWithShape="0">
+                    <a:schemeClr val="dk1">
+                      <a:alpha val="40000"/>
+                    </a:schemeClr>
+                  </a:outerShdw>
+                </a:effectLst>
+              </a:rPr>
+              <a:t>3</a:t>
+            </a:r>
+          </a:p>
+        </p:txBody>
+      </p:sp>
+      <p:sp>
+        <p:nvSpPr>
+          <p:cNvPr id="16" name="Ellipszis 15">
+            <a:extLst>
+              <a:ext uri="{FF2B5EF4-FFF2-40B4-BE49-F238E27FC236}">
+                <a16:creationId xmlns:a16="http://schemas.microsoft.com/office/drawing/2014/main" id="{81E2216F-0ED1-4F84-AB3B-561532161D03}"/>
+              </a:ext>
+            </a:extLst>
+          </p:cNvPr>
+          <p:cNvSpPr/>
+          <p:nvPr/>
+        </p:nvSpPr>
+        <p:spPr>
+          <a:xfrm>
+            <a:off x="7183211" y="3978061"/>
+            <a:ext cx="421894" cy="419553"/>
+          </a:xfrm>
+          <a:prstGeom prst="ellipse">
+            <a:avLst/>
+          </a:prstGeom>
+          <a:solidFill>
+            <a:schemeClr val="bg1"/>
+          </a:solidFill>
+        </p:spPr>
+        <p:style>
+          <a:lnRef idx="2">
+            <a:schemeClr val="accent1">
+              <a:shade val="50000"/>
+            </a:schemeClr>
+          </a:lnRef>
+          <a:fillRef idx="1">
+            <a:schemeClr val="accent1"/>
+          </a:fillRef>
+          <a:effectRef idx="0">
+            <a:schemeClr val="accent1"/>
+          </a:effectRef>
+          <a:fontRef idx="minor">
+            <a:schemeClr val="lt1"/>
+          </a:fontRef>
+        </p:style>
+        <p:txBody>
+          <a:bodyPr rtlCol="0" anchor="ctr"/>
+          <a:lstStyle/>
+          <a:p>
+            <a:pPr algn="ctr"/>
+            <a:r>
+              <a:rPr lang="hu-HU" dirty="0">
+                <a:ln w="0"/>
+                <a:solidFill>
+                  <a:schemeClr val="tx1"/>
+                </a:solidFill>
+                <a:effectLst>
+                  <a:outerShdw blurRad="38100" dist="19050" dir="2700000" algn="tl" rotWithShape="0">
+                    <a:schemeClr val="dk1">
+                      <a:alpha val="40000"/>
+                    </a:schemeClr>
+                  </a:outerShdw>
+                </a:effectLst>
+              </a:rPr>
+              <a:t>2</a:t>
+            </a:r>
+          </a:p>
+        </p:txBody>
+      </p:sp>
+      <p:sp>
+        <p:nvSpPr>
+          <p:cNvPr id="17" name="Ellipszis 16">
+            <a:extLst>
+              <a:ext uri="{FF2B5EF4-FFF2-40B4-BE49-F238E27FC236}">
+                <a16:creationId xmlns:a16="http://schemas.microsoft.com/office/drawing/2014/main" id="{C161DE59-D71F-46B3-81FA-96C238362529}"/>
+              </a:ext>
+            </a:extLst>
+          </p:cNvPr>
+          <p:cNvSpPr/>
+          <p:nvPr/>
+        </p:nvSpPr>
+        <p:spPr>
+          <a:xfrm>
+            <a:off x="5319698" y="4018537"/>
+            <a:ext cx="421894" cy="419553"/>
+          </a:xfrm>
+          <a:prstGeom prst="ellipse">
+            <a:avLst/>
+          </a:prstGeom>
+          <a:solidFill>
+            <a:schemeClr val="bg1"/>
+          </a:solidFill>
+        </p:spPr>
+        <p:style>
+          <a:lnRef idx="2">
+            <a:schemeClr val="accent1">
+              <a:shade val="50000"/>
+            </a:schemeClr>
+          </a:lnRef>
+          <a:fillRef idx="1">
+            <a:schemeClr val="accent1"/>
+          </a:fillRef>
+          <a:effectRef idx="0">
+            <a:schemeClr val="accent1"/>
+          </a:effectRef>
+          <a:fontRef idx="minor">
+            <a:schemeClr val="lt1"/>
+          </a:fontRef>
+        </p:style>
+        <p:txBody>
+          <a:bodyPr rtlCol="0" anchor="ctr"/>
+          <a:lstStyle/>
+          <a:p>
+            <a:pPr algn="ctr"/>
+            <a:r>
+              <a:rPr lang="hu-HU" dirty="0">
+                <a:ln w="0"/>
+                <a:solidFill>
+                  <a:schemeClr val="tx1"/>
+                </a:solidFill>
+                <a:effectLst>
+                  <a:outerShdw blurRad="38100" dist="19050" dir="2700000" algn="tl" rotWithShape="0">
+                    <a:schemeClr val="dk1">
+                      <a:alpha val="40000"/>
+                    </a:schemeClr>
+                  </a:outerShdw>
+                </a:effectLst>
+              </a:rPr>
+              <a:t>6</a:t>
+            </a:r>
+          </a:p>
+        </p:txBody>
+      </p:sp>
+      <p:cxnSp>
+        <p:nvCxnSpPr>
+          <p:cNvPr id="3" name="Egyenes összekötő nyíllal 2">
+            <a:extLst>
+              <a:ext uri="{FF2B5EF4-FFF2-40B4-BE49-F238E27FC236}">
+                <a16:creationId xmlns:a16="http://schemas.microsoft.com/office/drawing/2014/main" id="{3B7C2303-AD8B-47BD-B171-40E9D65AE941}"/>
+              </a:ext>
+            </a:extLst>
+          </p:cNvPr>
+          <p:cNvCxnSpPr>
+            <a:cxnSpLocks/>
+          </p:cNvCxnSpPr>
+          <p:nvPr/>
+        </p:nvCxnSpPr>
+        <p:spPr>
+          <a:xfrm>
+            <a:off x="6655467" y="3752738"/>
+            <a:ext cx="589529" cy="321258"/>
+          </a:xfrm>
+          <a:prstGeom prst="straightConnector1">
+            <a:avLst/>
+          </a:prstGeom>
+          <a:ln>
+            <a:tailEnd type="triangle"/>
+          </a:ln>
+        </p:spPr>
+        <p:style>
+          <a:lnRef idx="1">
+            <a:schemeClr val="accent1"/>
+          </a:lnRef>
+          <a:fillRef idx="0">
+            <a:schemeClr val="accent1"/>
+          </a:fillRef>
+          <a:effectRef idx="0">
+            <a:schemeClr val="accent1"/>
+          </a:effectRef>
+          <a:fontRef idx="minor">
+            <a:schemeClr val="tx1"/>
+          </a:fontRef>
+        </p:style>
+      </p:cxnSp>
+      <p:cxnSp>
+        <p:nvCxnSpPr>
+          <p:cNvPr id="18" name="Egyenes összekötő nyíllal 17">
+            <a:extLst>
+              <a:ext uri="{FF2B5EF4-FFF2-40B4-BE49-F238E27FC236}">
+                <a16:creationId xmlns:a16="http://schemas.microsoft.com/office/drawing/2014/main" id="{ACA86D39-A705-4ABD-9A10-4F6E59CD716A}"/>
+              </a:ext>
+            </a:extLst>
+          </p:cNvPr>
+          <p:cNvCxnSpPr>
+            <a:cxnSpLocks/>
+            <a:stCxn id="16" idx="4"/>
+            <a:endCxn id="15" idx="1"/>
+          </p:cNvCxnSpPr>
+          <p:nvPr/>
+        </p:nvCxnSpPr>
+        <p:spPr>
+          <a:xfrm flipH="1">
+            <a:off x="7244996" y="4397614"/>
+            <a:ext cx="149162" cy="582895"/>
+          </a:xfrm>
+          <a:prstGeom prst="straightConnector1">
+            <a:avLst/>
+          </a:prstGeom>
+          <a:ln>
+            <a:tailEnd type="triangle"/>
+          </a:ln>
+        </p:spPr>
+        <p:style>
+          <a:lnRef idx="1">
+            <a:schemeClr val="accent1"/>
+          </a:lnRef>
+          <a:fillRef idx="0">
+            <a:schemeClr val="accent1"/>
+          </a:fillRef>
+          <a:effectRef idx="0">
+            <a:schemeClr val="accent1"/>
+          </a:effectRef>
+          <a:fontRef idx="minor">
+            <a:schemeClr val="tx1"/>
+          </a:fontRef>
+        </p:style>
+      </p:cxnSp>
+      <p:cxnSp>
+        <p:nvCxnSpPr>
+          <p:cNvPr id="20" name="Egyenes összekötő nyíllal 19">
+            <a:extLst>
+              <a:ext uri="{FF2B5EF4-FFF2-40B4-BE49-F238E27FC236}">
+                <a16:creationId xmlns:a16="http://schemas.microsoft.com/office/drawing/2014/main" id="{C441581D-7A1E-40C2-82ED-3504F8FFFB94}"/>
+              </a:ext>
+            </a:extLst>
+          </p:cNvPr>
+          <p:cNvCxnSpPr>
+            <a:cxnSpLocks/>
+            <a:endCxn id="15" idx="7"/>
+          </p:cNvCxnSpPr>
+          <p:nvPr/>
+        </p:nvCxnSpPr>
+        <p:spPr>
+          <a:xfrm>
+            <a:off x="7470358" y="4397613"/>
+            <a:ext cx="72962" cy="582896"/>
+          </a:xfrm>
+          <a:prstGeom prst="straightConnector1">
+            <a:avLst/>
+          </a:prstGeom>
+          <a:ln>
+            <a:tailEnd type="triangle"/>
+          </a:ln>
+        </p:spPr>
+        <p:style>
+          <a:lnRef idx="1">
+            <a:schemeClr val="accent1"/>
+          </a:lnRef>
+          <a:fillRef idx="0">
+            <a:schemeClr val="accent1"/>
+          </a:fillRef>
+          <a:effectRef idx="0">
+            <a:schemeClr val="accent1"/>
+          </a:effectRef>
+          <a:fontRef idx="minor">
+            <a:schemeClr val="tx1"/>
+          </a:fontRef>
+        </p:style>
+      </p:cxnSp>
+      <p:cxnSp>
+        <p:nvCxnSpPr>
+          <p:cNvPr id="26" name="Egyenes összekötő nyíllal 25">
+            <a:extLst>
+              <a:ext uri="{FF2B5EF4-FFF2-40B4-BE49-F238E27FC236}">
+                <a16:creationId xmlns:a16="http://schemas.microsoft.com/office/drawing/2014/main" id="{7F461830-7B4A-45AE-AA34-6D457D2FD768}"/>
+              </a:ext>
+            </a:extLst>
+          </p:cNvPr>
+          <p:cNvCxnSpPr>
+            <a:cxnSpLocks/>
+            <a:stCxn id="15" idx="2"/>
+            <a:endCxn id="14" idx="0"/>
+          </p:cNvCxnSpPr>
+          <p:nvPr/>
+        </p:nvCxnSpPr>
+        <p:spPr>
+          <a:xfrm flipH="1">
+            <a:off x="6444520" y="5128844"/>
+            <a:ext cx="738691" cy="261204"/>
+          </a:xfrm>
+          <a:prstGeom prst="straightConnector1">
+            <a:avLst/>
+          </a:prstGeom>
+          <a:ln>
+            <a:tailEnd type="triangle"/>
+          </a:ln>
+        </p:spPr>
+        <p:style>
+          <a:lnRef idx="1">
+            <a:schemeClr val="accent1"/>
+          </a:lnRef>
+          <a:fillRef idx="0">
+            <a:schemeClr val="accent1"/>
+          </a:fillRef>
+          <a:effectRef idx="0">
+            <a:schemeClr val="accent1"/>
+          </a:effectRef>
+          <a:fontRef idx="minor">
+            <a:schemeClr val="tx1"/>
+          </a:fontRef>
+        </p:style>
+      </p:cxnSp>
+      <p:cxnSp>
+        <p:nvCxnSpPr>
+          <p:cNvPr id="27" name="Egyenes összekötő nyíllal 26">
+            <a:extLst>
+              <a:ext uri="{FF2B5EF4-FFF2-40B4-BE49-F238E27FC236}">
+                <a16:creationId xmlns:a16="http://schemas.microsoft.com/office/drawing/2014/main" id="{B24C8AE0-A535-45DE-9838-200151486815}"/>
+              </a:ext>
+            </a:extLst>
+          </p:cNvPr>
+          <p:cNvCxnSpPr>
+            <a:cxnSpLocks/>
+            <a:stCxn id="15" idx="3"/>
+            <a:endCxn id="14" idx="6"/>
+          </p:cNvCxnSpPr>
+          <p:nvPr/>
+        </p:nvCxnSpPr>
+        <p:spPr>
+          <a:xfrm flipH="1">
+            <a:off x="6655467" y="5277178"/>
+            <a:ext cx="589529" cy="322647"/>
+          </a:xfrm>
+          <a:prstGeom prst="straightConnector1">
+            <a:avLst/>
+          </a:prstGeom>
+          <a:ln>
+            <a:tailEnd type="triangle"/>
+          </a:ln>
+        </p:spPr>
+        <p:style>
+          <a:lnRef idx="1">
+            <a:schemeClr val="accent1"/>
+          </a:lnRef>
+          <a:fillRef idx="0">
+            <a:schemeClr val="accent1"/>
+          </a:fillRef>
+          <a:effectRef idx="0">
+            <a:schemeClr val="accent1"/>
+          </a:effectRef>
+          <a:fontRef idx="minor">
+            <a:schemeClr val="tx1"/>
+          </a:fontRef>
+        </p:style>
+      </p:cxnSp>
+      <p:cxnSp>
+        <p:nvCxnSpPr>
+          <p:cNvPr id="30" name="Egyenes összekötő nyíllal 29">
+            <a:extLst>
+              <a:ext uri="{FF2B5EF4-FFF2-40B4-BE49-F238E27FC236}">
+                <a16:creationId xmlns:a16="http://schemas.microsoft.com/office/drawing/2014/main" id="{188A565A-D93F-4766-A2C5-D018A14F3972}"/>
+              </a:ext>
+            </a:extLst>
+          </p:cNvPr>
+          <p:cNvCxnSpPr>
+            <a:cxnSpLocks/>
+            <a:stCxn id="15" idx="4"/>
+            <a:endCxn id="14" idx="5"/>
+          </p:cNvCxnSpPr>
+          <p:nvPr/>
+        </p:nvCxnSpPr>
+        <p:spPr>
+          <a:xfrm flipH="1">
+            <a:off x="6593682" y="5338620"/>
+            <a:ext cx="800476" cy="409539"/>
+          </a:xfrm>
+          <a:prstGeom prst="straightConnector1">
+            <a:avLst/>
+          </a:prstGeom>
+          <a:ln>
+            <a:tailEnd type="triangle"/>
+          </a:ln>
+        </p:spPr>
+        <p:style>
+          <a:lnRef idx="1">
+            <a:schemeClr val="accent1"/>
+          </a:lnRef>
+          <a:fillRef idx="0">
+            <a:schemeClr val="accent1"/>
+          </a:fillRef>
+          <a:effectRef idx="0">
+            <a:schemeClr val="accent1"/>
+          </a:effectRef>
+          <a:fontRef idx="minor">
+            <a:schemeClr val="tx1"/>
+          </a:fontRef>
+        </p:style>
+      </p:cxnSp>
+      <p:cxnSp>
+        <p:nvCxnSpPr>
+          <p:cNvPr id="34" name="Egyenes összekötő nyíllal 33">
+            <a:extLst>
+              <a:ext uri="{FF2B5EF4-FFF2-40B4-BE49-F238E27FC236}">
+                <a16:creationId xmlns:a16="http://schemas.microsoft.com/office/drawing/2014/main" id="{A952BD21-D17A-4CDB-AD2A-E14F9D7CECE3}"/>
+              </a:ext>
+            </a:extLst>
+          </p:cNvPr>
+          <p:cNvCxnSpPr>
+            <a:cxnSpLocks/>
+            <a:stCxn id="14" idx="2"/>
+            <a:endCxn id="17" idx="4"/>
+          </p:cNvCxnSpPr>
+          <p:nvPr/>
+        </p:nvCxnSpPr>
+        <p:spPr>
+          <a:xfrm flipH="1" flipV="1">
+            <a:off x="5530645" y="4438090"/>
+            <a:ext cx="702928" cy="1161735"/>
+          </a:xfrm>
+          <a:prstGeom prst="straightConnector1">
+            <a:avLst/>
+          </a:prstGeom>
+          <a:ln>
+            <a:tailEnd type="triangle"/>
+          </a:ln>
+        </p:spPr>
+        <p:style>
+          <a:lnRef idx="1">
+            <a:schemeClr val="accent1"/>
+          </a:lnRef>
+          <a:fillRef idx="0">
+            <a:schemeClr val="accent1"/>
+          </a:fillRef>
+          <a:effectRef idx="0">
+            <a:schemeClr val="accent1"/>
+          </a:effectRef>
+          <a:fontRef idx="minor">
+            <a:schemeClr val="tx1"/>
+          </a:fontRef>
+        </p:style>
+      </p:cxnSp>
+      <p:cxnSp>
+        <p:nvCxnSpPr>
+          <p:cNvPr id="36" name="Egyenes összekötő nyíllal 35">
+            <a:extLst>
+              <a:ext uri="{FF2B5EF4-FFF2-40B4-BE49-F238E27FC236}">
+                <a16:creationId xmlns:a16="http://schemas.microsoft.com/office/drawing/2014/main" id="{080C1544-812C-4E19-A8A1-5F24DEEF95F1}"/>
+              </a:ext>
+            </a:extLst>
+          </p:cNvPr>
+          <p:cNvCxnSpPr>
+            <a:cxnSpLocks/>
+            <a:stCxn id="14" idx="1"/>
+            <a:endCxn id="17" idx="5"/>
+          </p:cNvCxnSpPr>
+          <p:nvPr/>
+        </p:nvCxnSpPr>
+        <p:spPr>
+          <a:xfrm flipH="1" flipV="1">
+            <a:off x="5679807" y="4376648"/>
+            <a:ext cx="615551" cy="1074842"/>
+          </a:xfrm>
+          <a:prstGeom prst="straightConnector1">
+            <a:avLst/>
+          </a:prstGeom>
+          <a:ln>
+            <a:tailEnd type="triangle"/>
+          </a:ln>
+        </p:spPr>
+        <p:style>
+          <a:lnRef idx="1">
+            <a:schemeClr val="accent1"/>
+          </a:lnRef>
+          <a:fillRef idx="0">
+            <a:schemeClr val="accent1"/>
+          </a:fillRef>
+          <a:effectRef idx="0">
+            <a:schemeClr val="accent1"/>
+          </a:effectRef>
+          <a:fontRef idx="minor">
+            <a:schemeClr val="tx1"/>
+          </a:fontRef>
+        </p:style>
+      </p:cxnSp>
+      <p:cxnSp>
+        <p:nvCxnSpPr>
+          <p:cNvPr id="39" name="Egyenes összekötő nyíllal 38">
+            <a:extLst>
+              <a:ext uri="{FF2B5EF4-FFF2-40B4-BE49-F238E27FC236}">
+                <a16:creationId xmlns:a16="http://schemas.microsoft.com/office/drawing/2014/main" id="{E0725F5D-7BC2-45D0-8170-B3B10E781EDD}"/>
+              </a:ext>
+            </a:extLst>
+          </p:cNvPr>
+          <p:cNvCxnSpPr>
+            <a:cxnSpLocks/>
+            <a:stCxn id="14" idx="0"/>
+            <a:endCxn id="17" idx="6"/>
+          </p:cNvCxnSpPr>
+          <p:nvPr/>
+        </p:nvCxnSpPr>
+        <p:spPr>
+          <a:xfrm flipH="1" flipV="1">
+            <a:off x="5741592" y="4228314"/>
+            <a:ext cx="702928" cy="1161734"/>
+          </a:xfrm>
+          <a:prstGeom prst="straightConnector1">
+            <a:avLst/>
+          </a:prstGeom>
+          <a:ln>
+            <a:tailEnd type="triangle"/>
+          </a:ln>
+        </p:spPr>
+        <p:style>
+          <a:lnRef idx="1">
+            <a:schemeClr val="accent1"/>
+          </a:lnRef>
+          <a:fillRef idx="0">
+            <a:schemeClr val="accent1"/>
+          </a:fillRef>
+          <a:effectRef idx="0">
+            <a:schemeClr val="accent1"/>
+          </a:effectRef>
+          <a:fontRef idx="minor">
+            <a:schemeClr val="tx1"/>
+          </a:fontRef>
+        </p:style>
+      </p:cxnSp>
+      <p:sp>
+        <p:nvSpPr>
+          <p:cNvPr id="42" name="Ellipszis 41">
+            <a:extLst>
+              <a:ext uri="{FF2B5EF4-FFF2-40B4-BE49-F238E27FC236}">
+                <a16:creationId xmlns:a16="http://schemas.microsoft.com/office/drawing/2014/main" id="{258B66A8-BE5F-4E59-BC82-21E19ED93F1C}"/>
+              </a:ext>
+            </a:extLst>
+          </p:cNvPr>
+          <p:cNvSpPr/>
+          <p:nvPr/>
+        </p:nvSpPr>
+        <p:spPr>
+          <a:xfrm>
+            <a:off x="9277945" y="3417819"/>
+            <a:ext cx="421894" cy="390245"/>
+          </a:xfrm>
+          <a:prstGeom prst="ellipse">
+            <a:avLst/>
+          </a:prstGeom>
+          <a:solidFill>
+            <a:schemeClr val="bg1"/>
+          </a:solidFill>
+        </p:spPr>
+        <p:style>
+          <a:lnRef idx="2">
+            <a:schemeClr val="accent1">
+              <a:shade val="50000"/>
+            </a:schemeClr>
+          </a:lnRef>
+          <a:fillRef idx="1">
+            <a:schemeClr val="accent1"/>
+          </a:fillRef>
+          <a:effectRef idx="0">
+            <a:schemeClr val="accent1"/>
+          </a:effectRef>
+          <a:fontRef idx="minor">
+            <a:schemeClr val="lt1"/>
+          </a:fontRef>
+        </p:style>
+        <p:txBody>
+          <a:bodyPr rtlCol="0" anchor="ctr"/>
+          <a:lstStyle/>
+          <a:p>
+            <a:pPr algn="ctr"/>
+            <a:r>
+              <a:rPr lang="hu-HU" dirty="0">
+                <a:ln w="0"/>
+                <a:solidFill>
+                  <a:schemeClr val="tx1"/>
+                </a:solidFill>
+                <a:effectLst>
+                  <a:outerShdw blurRad="38100" dist="19050" dir="2700000" algn="tl" rotWithShape="0">
+                    <a:schemeClr val="dk1">
+                      <a:alpha val="40000"/>
+                    </a:schemeClr>
+                  </a:outerShdw>
+                </a:effectLst>
+              </a:rPr>
+              <a:t>1</a:t>
+            </a:r>
+          </a:p>
+        </p:txBody>
+      </p:sp>
+      <p:sp>
+        <p:nvSpPr>
+          <p:cNvPr id="43" name="Ellipszis 42">
+            <a:extLst>
+              <a:ext uri="{FF2B5EF4-FFF2-40B4-BE49-F238E27FC236}">
+                <a16:creationId xmlns:a16="http://schemas.microsoft.com/office/drawing/2014/main" id="{72DDDA77-9B5D-4A9B-A743-CFC15A30FD36}"/>
+              </a:ext>
+            </a:extLst>
+          </p:cNvPr>
+          <p:cNvSpPr/>
+          <p:nvPr/>
+        </p:nvSpPr>
+        <p:spPr>
+          <a:xfrm>
+            <a:off x="8364070" y="4813765"/>
+            <a:ext cx="421894" cy="419553"/>
+          </a:xfrm>
+          <a:prstGeom prst="ellipse">
+            <a:avLst/>
+          </a:prstGeom>
+          <a:solidFill>
+            <a:schemeClr val="bg1"/>
+          </a:solidFill>
+        </p:spPr>
+        <p:style>
+          <a:lnRef idx="2">
+            <a:schemeClr val="accent1">
+              <a:shade val="50000"/>
+            </a:schemeClr>
+          </a:lnRef>
+          <a:fillRef idx="1">
+            <a:schemeClr val="accent1"/>
+          </a:fillRef>
+          <a:effectRef idx="0">
+            <a:schemeClr val="accent1"/>
+          </a:effectRef>
+          <a:fontRef idx="minor">
+            <a:schemeClr val="lt1"/>
+          </a:fontRef>
+        </p:style>
+        <p:txBody>
+          <a:bodyPr rtlCol="0" anchor="ctr"/>
+          <a:lstStyle/>
+          <a:p>
+            <a:pPr algn="ctr"/>
+            <a:r>
+              <a:rPr lang="hu-HU" dirty="0">
+                <a:ln w="0"/>
+                <a:solidFill>
+                  <a:schemeClr val="tx1"/>
+                </a:solidFill>
+                <a:effectLst>
+                  <a:outerShdw blurRad="38100" dist="19050" dir="2700000" algn="tl" rotWithShape="0">
+                    <a:schemeClr val="dk1">
+                      <a:alpha val="40000"/>
+                    </a:schemeClr>
+                  </a:outerShdw>
+                </a:effectLst>
+              </a:rPr>
+              <a:t>5</a:t>
+            </a:r>
+          </a:p>
+        </p:txBody>
+      </p:sp>
+      <p:sp>
+        <p:nvSpPr>
+          <p:cNvPr id="44" name="Ellipszis 43">
+            <a:extLst>
+              <a:ext uri="{FF2B5EF4-FFF2-40B4-BE49-F238E27FC236}">
+                <a16:creationId xmlns:a16="http://schemas.microsoft.com/office/drawing/2014/main" id="{12CE47F8-D4E1-40C6-A1F2-12F83F5F1233}"/>
+              </a:ext>
+            </a:extLst>
+          </p:cNvPr>
+          <p:cNvSpPr/>
+          <p:nvPr/>
+        </p:nvSpPr>
+        <p:spPr>
+          <a:xfrm>
+            <a:off x="9277945" y="5284745"/>
+            <a:ext cx="421894" cy="419553"/>
+          </a:xfrm>
+          <a:prstGeom prst="ellipse">
+            <a:avLst/>
+          </a:prstGeom>
+          <a:solidFill>
+            <a:schemeClr val="bg1"/>
+          </a:solidFill>
+        </p:spPr>
+        <p:style>
+          <a:lnRef idx="2">
+            <a:schemeClr val="accent1">
+              <a:shade val="50000"/>
+            </a:schemeClr>
+          </a:lnRef>
+          <a:fillRef idx="1">
+            <a:schemeClr val="accent1"/>
+          </a:fillRef>
+          <a:effectRef idx="0">
+            <a:schemeClr val="accent1"/>
+          </a:effectRef>
+          <a:fontRef idx="minor">
+            <a:schemeClr val="lt1"/>
+          </a:fontRef>
+        </p:style>
+        <p:txBody>
+          <a:bodyPr rtlCol="0" anchor="ctr"/>
+          <a:lstStyle/>
+          <a:p>
+            <a:pPr algn="ctr"/>
+            <a:r>
+              <a:rPr lang="hu-HU" dirty="0">
+                <a:ln w="0"/>
+                <a:solidFill>
+                  <a:schemeClr val="tx1"/>
+                </a:solidFill>
+                <a:effectLst>
+                  <a:outerShdw blurRad="38100" dist="19050" dir="2700000" algn="tl" rotWithShape="0">
+                    <a:schemeClr val="dk1">
+                      <a:alpha val="40000"/>
+                    </a:schemeClr>
+                  </a:outerShdw>
+                </a:effectLst>
+              </a:rPr>
+              <a:t>4</a:t>
+            </a:r>
+          </a:p>
+        </p:txBody>
+      </p:sp>
+      <p:sp>
+        <p:nvSpPr>
+          <p:cNvPr id="45" name="Ellipszis 44">
+            <a:extLst>
+              <a:ext uri="{FF2B5EF4-FFF2-40B4-BE49-F238E27FC236}">
+                <a16:creationId xmlns:a16="http://schemas.microsoft.com/office/drawing/2014/main" id="{01087318-3370-4A1D-A4D0-1047838401E6}"/>
+              </a:ext>
+            </a:extLst>
+          </p:cNvPr>
+          <p:cNvSpPr/>
+          <p:nvPr/>
+        </p:nvSpPr>
+        <p:spPr>
+          <a:xfrm>
+            <a:off x="10227583" y="4813764"/>
+            <a:ext cx="421894" cy="419553"/>
+          </a:xfrm>
+          <a:prstGeom prst="ellipse">
+            <a:avLst/>
+          </a:prstGeom>
+          <a:solidFill>
+            <a:schemeClr val="bg1"/>
+          </a:solidFill>
+        </p:spPr>
+        <p:style>
+          <a:lnRef idx="2">
+            <a:schemeClr val="accent1">
+              <a:shade val="50000"/>
+            </a:schemeClr>
+          </a:lnRef>
+          <a:fillRef idx="1">
+            <a:schemeClr val="accent1"/>
+          </a:fillRef>
+          <a:effectRef idx="0">
+            <a:schemeClr val="accent1"/>
+          </a:effectRef>
+          <a:fontRef idx="minor">
+            <a:schemeClr val="lt1"/>
+          </a:fontRef>
+        </p:style>
+        <p:txBody>
+          <a:bodyPr rtlCol="0" anchor="ctr"/>
+          <a:lstStyle/>
+          <a:p>
+            <a:pPr algn="ctr"/>
+            <a:r>
+              <a:rPr lang="hu-HU" dirty="0">
+                <a:ln w="0"/>
+                <a:solidFill>
+                  <a:schemeClr val="tx1"/>
+                </a:solidFill>
+                <a:effectLst>
+                  <a:outerShdw blurRad="38100" dist="19050" dir="2700000" algn="tl" rotWithShape="0">
+                    <a:schemeClr val="dk1">
+                      <a:alpha val="40000"/>
+                    </a:schemeClr>
+                  </a:outerShdw>
+                </a:effectLst>
+              </a:rPr>
+              <a:t>3</a:t>
+            </a:r>
+          </a:p>
+        </p:txBody>
+      </p:sp>
+      <p:sp>
+        <p:nvSpPr>
+          <p:cNvPr id="46" name="Ellipszis 45">
+            <a:extLst>
+              <a:ext uri="{FF2B5EF4-FFF2-40B4-BE49-F238E27FC236}">
+                <a16:creationId xmlns:a16="http://schemas.microsoft.com/office/drawing/2014/main" id="{90E2A985-F844-4F26-AAFA-3EC781DDD25F}"/>
+              </a:ext>
+            </a:extLst>
+          </p:cNvPr>
+          <p:cNvSpPr/>
+          <p:nvPr/>
+        </p:nvSpPr>
+        <p:spPr>
+          <a:xfrm>
+            <a:off x="10227583" y="3872758"/>
+            <a:ext cx="421894" cy="419553"/>
+          </a:xfrm>
+          <a:prstGeom prst="ellipse">
+            <a:avLst/>
+          </a:prstGeom>
+          <a:solidFill>
+            <a:schemeClr val="bg1"/>
+          </a:solidFill>
+        </p:spPr>
+        <p:style>
+          <a:lnRef idx="2">
+            <a:schemeClr val="accent1">
+              <a:shade val="50000"/>
+            </a:schemeClr>
+          </a:lnRef>
+          <a:fillRef idx="1">
+            <a:schemeClr val="accent1"/>
+          </a:fillRef>
+          <a:effectRef idx="0">
+            <a:schemeClr val="accent1"/>
+          </a:effectRef>
+          <a:fontRef idx="minor">
+            <a:schemeClr val="lt1"/>
+          </a:fontRef>
+        </p:style>
+        <p:txBody>
+          <a:bodyPr rtlCol="0" anchor="ctr"/>
+          <a:lstStyle/>
+          <a:p>
+            <a:pPr algn="ctr"/>
+            <a:r>
+              <a:rPr lang="hu-HU" dirty="0">
+                <a:ln w="0"/>
+                <a:solidFill>
+                  <a:schemeClr val="tx1"/>
+                </a:solidFill>
+                <a:effectLst>
+                  <a:outerShdw blurRad="38100" dist="19050" dir="2700000" algn="tl" rotWithShape="0">
+                    <a:schemeClr val="dk1">
+                      <a:alpha val="40000"/>
+                    </a:schemeClr>
+                  </a:outerShdw>
+                </a:effectLst>
+              </a:rPr>
+              <a:t>2</a:t>
+            </a:r>
+          </a:p>
+        </p:txBody>
+      </p:sp>
+      <p:sp>
+        <p:nvSpPr>
+          <p:cNvPr id="47" name="Ellipszis 46">
+            <a:extLst>
+              <a:ext uri="{FF2B5EF4-FFF2-40B4-BE49-F238E27FC236}">
+                <a16:creationId xmlns:a16="http://schemas.microsoft.com/office/drawing/2014/main" id="{4679B146-15D8-4398-BAF6-7BCC410D7EE7}"/>
+              </a:ext>
+            </a:extLst>
+          </p:cNvPr>
+          <p:cNvSpPr/>
+          <p:nvPr/>
+        </p:nvSpPr>
+        <p:spPr>
+          <a:xfrm>
+            <a:off x="8364070" y="3913234"/>
+            <a:ext cx="421894" cy="419553"/>
+          </a:xfrm>
+          <a:prstGeom prst="ellipse">
+            <a:avLst/>
+          </a:prstGeom>
+          <a:solidFill>
+            <a:schemeClr val="bg1"/>
+          </a:solidFill>
+        </p:spPr>
+        <p:style>
+          <a:lnRef idx="2">
+            <a:schemeClr val="accent1">
+              <a:shade val="50000"/>
+            </a:schemeClr>
+          </a:lnRef>
+          <a:fillRef idx="1">
+            <a:schemeClr val="accent1"/>
+          </a:fillRef>
+          <a:effectRef idx="0">
+            <a:schemeClr val="accent1"/>
+          </a:effectRef>
+          <a:fontRef idx="minor">
+            <a:schemeClr val="lt1"/>
+          </a:fontRef>
+        </p:style>
+        <p:txBody>
+          <a:bodyPr rtlCol="0" anchor="ctr"/>
+          <a:lstStyle/>
+          <a:p>
+            <a:pPr algn="ctr"/>
+            <a:r>
+              <a:rPr lang="hu-HU" dirty="0">
+                <a:ln w="0"/>
+                <a:solidFill>
+                  <a:schemeClr val="tx1"/>
+                </a:solidFill>
+                <a:effectLst>
+                  <a:outerShdw blurRad="38100" dist="19050" dir="2700000" algn="tl" rotWithShape="0">
+                    <a:schemeClr val="dk1">
+                      <a:alpha val="40000"/>
+                    </a:schemeClr>
+                  </a:outerShdw>
+                </a:effectLst>
+              </a:rPr>
+              <a:t>6</a:t>
+            </a:r>
+          </a:p>
+        </p:txBody>
+      </p:sp>
+      <p:cxnSp>
+        <p:nvCxnSpPr>
+          <p:cNvPr id="48" name="Egyenes összekötő nyíllal 47">
+            <a:extLst>
+              <a:ext uri="{FF2B5EF4-FFF2-40B4-BE49-F238E27FC236}">
+                <a16:creationId xmlns:a16="http://schemas.microsoft.com/office/drawing/2014/main" id="{22D6AA96-3D7F-434C-B2A4-ABDC4BB92557}"/>
+              </a:ext>
+            </a:extLst>
+          </p:cNvPr>
+          <p:cNvCxnSpPr>
+            <a:cxnSpLocks/>
+          </p:cNvCxnSpPr>
+          <p:nvPr/>
+        </p:nvCxnSpPr>
+        <p:spPr>
+          <a:xfrm>
+            <a:off x="9699839" y="3647435"/>
+            <a:ext cx="589529" cy="321258"/>
+          </a:xfrm>
+          <a:prstGeom prst="straightConnector1">
+            <a:avLst/>
+          </a:prstGeom>
+          <a:ln>
+            <a:tailEnd type="triangle"/>
+          </a:ln>
+        </p:spPr>
+        <p:style>
+          <a:lnRef idx="1">
+            <a:schemeClr val="accent1"/>
+          </a:lnRef>
+          <a:fillRef idx="0">
+            <a:schemeClr val="accent1"/>
+          </a:fillRef>
+          <a:effectRef idx="0">
+            <a:schemeClr val="accent1"/>
+          </a:effectRef>
+          <a:fontRef idx="minor">
+            <a:schemeClr val="tx1"/>
+          </a:fontRef>
+        </p:style>
+      </p:cxnSp>
+      <p:cxnSp>
+        <p:nvCxnSpPr>
+          <p:cNvPr id="49" name="Egyenes összekötő nyíllal 48">
+            <a:extLst>
+              <a:ext uri="{FF2B5EF4-FFF2-40B4-BE49-F238E27FC236}">
+                <a16:creationId xmlns:a16="http://schemas.microsoft.com/office/drawing/2014/main" id="{A1FB7530-C2FA-43C2-A486-128570DA487A}"/>
+              </a:ext>
+            </a:extLst>
+          </p:cNvPr>
+          <p:cNvCxnSpPr>
+            <a:cxnSpLocks/>
+            <a:stCxn id="46" idx="4"/>
+            <a:endCxn id="45" idx="0"/>
+          </p:cNvCxnSpPr>
+          <p:nvPr/>
+        </p:nvCxnSpPr>
+        <p:spPr>
+          <a:xfrm>
+            <a:off x="10438530" y="4292311"/>
+            <a:ext cx="0" cy="521453"/>
+          </a:xfrm>
+          <a:prstGeom prst="straightConnector1">
+            <a:avLst/>
+          </a:prstGeom>
+          <a:ln>
+            <a:tailEnd type="triangle"/>
+          </a:ln>
+        </p:spPr>
+        <p:style>
+          <a:lnRef idx="1">
+            <a:schemeClr val="accent1"/>
+          </a:lnRef>
+          <a:fillRef idx="0">
+            <a:schemeClr val="accent1"/>
+          </a:fillRef>
+          <a:effectRef idx="0">
+            <a:schemeClr val="accent1"/>
+          </a:effectRef>
+          <a:fontRef idx="minor">
+            <a:schemeClr val="tx1"/>
+          </a:fontRef>
+        </p:style>
+      </p:cxnSp>
+      <p:cxnSp>
+        <p:nvCxnSpPr>
+          <p:cNvPr id="51" name="Egyenes összekötő nyíllal 50">
+            <a:extLst>
+              <a:ext uri="{FF2B5EF4-FFF2-40B4-BE49-F238E27FC236}">
+                <a16:creationId xmlns:a16="http://schemas.microsoft.com/office/drawing/2014/main" id="{B608C0F1-DBD2-4FD0-82C1-9755B05B32D1}"/>
+              </a:ext>
+            </a:extLst>
+          </p:cNvPr>
+          <p:cNvCxnSpPr>
+            <a:stCxn id="45" idx="2"/>
+            <a:endCxn id="44" idx="0"/>
+          </p:cNvCxnSpPr>
+          <p:nvPr/>
+        </p:nvCxnSpPr>
+        <p:spPr>
+          <a:xfrm flipH="1">
+            <a:off x="9488892" y="5023541"/>
+            <a:ext cx="738691" cy="261204"/>
+          </a:xfrm>
+          <a:prstGeom prst="straightConnector1">
+            <a:avLst/>
+          </a:prstGeom>
+          <a:ln>
+            <a:tailEnd type="triangle"/>
+          </a:ln>
+        </p:spPr>
+        <p:style>
+          <a:lnRef idx="1">
+            <a:schemeClr val="accent1"/>
+          </a:lnRef>
+          <a:fillRef idx="0">
+            <a:schemeClr val="accent1"/>
+          </a:fillRef>
+          <a:effectRef idx="0">
+            <a:schemeClr val="accent1"/>
+          </a:effectRef>
+          <a:fontRef idx="minor">
+            <a:schemeClr val="tx1"/>
+          </a:fontRef>
+        </p:style>
+      </p:cxnSp>
+      <p:cxnSp>
+        <p:nvCxnSpPr>
+          <p:cNvPr id="53" name="Egyenes összekötő nyíllal 52">
+            <a:extLst>
+              <a:ext uri="{FF2B5EF4-FFF2-40B4-BE49-F238E27FC236}">
+                <a16:creationId xmlns:a16="http://schemas.microsoft.com/office/drawing/2014/main" id="{3E1A2EF1-E822-48F7-9AA3-79E6DBB325A2}"/>
+              </a:ext>
+            </a:extLst>
+          </p:cNvPr>
+          <p:cNvCxnSpPr>
+            <a:cxnSpLocks/>
+            <a:stCxn id="45" idx="4"/>
+            <a:endCxn id="44" idx="6"/>
+          </p:cNvCxnSpPr>
+          <p:nvPr/>
+        </p:nvCxnSpPr>
+        <p:spPr>
+          <a:xfrm flipH="1">
+            <a:off x="9699839" y="5233317"/>
+            <a:ext cx="738691" cy="261205"/>
+          </a:xfrm>
+          <a:prstGeom prst="straightConnector1">
+            <a:avLst/>
+          </a:prstGeom>
+          <a:ln>
+            <a:tailEnd type="triangle"/>
+          </a:ln>
+        </p:spPr>
+        <p:style>
+          <a:lnRef idx="1">
+            <a:schemeClr val="accent1"/>
+          </a:lnRef>
+          <a:fillRef idx="0">
+            <a:schemeClr val="accent1"/>
+          </a:fillRef>
+          <a:effectRef idx="0">
+            <a:schemeClr val="accent1"/>
+          </a:effectRef>
+          <a:fontRef idx="minor">
+            <a:schemeClr val="tx1"/>
+          </a:fontRef>
+        </p:style>
+      </p:cxnSp>
+      <p:cxnSp>
+        <p:nvCxnSpPr>
+          <p:cNvPr id="54" name="Egyenes összekötő nyíllal 53">
+            <a:extLst>
+              <a:ext uri="{FF2B5EF4-FFF2-40B4-BE49-F238E27FC236}">
+                <a16:creationId xmlns:a16="http://schemas.microsoft.com/office/drawing/2014/main" id="{E68234D6-F355-44F6-8D3D-D3601E7E7AC2}"/>
+              </a:ext>
+            </a:extLst>
+          </p:cNvPr>
+          <p:cNvCxnSpPr>
+            <a:cxnSpLocks/>
+            <a:stCxn id="44" idx="2"/>
+          </p:cNvCxnSpPr>
+          <p:nvPr/>
+        </p:nvCxnSpPr>
+        <p:spPr>
+          <a:xfrm flipH="1" flipV="1">
+            <a:off x="8662611" y="4321426"/>
+            <a:ext cx="615334" cy="1173096"/>
+          </a:xfrm>
+          <a:prstGeom prst="straightConnector1">
+            <a:avLst/>
+          </a:prstGeom>
+          <a:ln>
+            <a:tailEnd type="triangle"/>
+          </a:ln>
+        </p:spPr>
+        <p:style>
+          <a:lnRef idx="1">
+            <a:schemeClr val="accent1"/>
+          </a:lnRef>
+          <a:fillRef idx="0">
+            <a:schemeClr val="accent1"/>
+          </a:fillRef>
+          <a:effectRef idx="0">
+            <a:schemeClr val="accent1"/>
+          </a:effectRef>
+          <a:fontRef idx="minor">
+            <a:schemeClr val="tx1"/>
+          </a:fontRef>
+        </p:style>
+      </p:cxnSp>
+      <p:cxnSp>
+        <p:nvCxnSpPr>
+          <p:cNvPr id="55" name="Egyenes összekötő nyíllal 54">
+            <a:extLst>
+              <a:ext uri="{FF2B5EF4-FFF2-40B4-BE49-F238E27FC236}">
+                <a16:creationId xmlns:a16="http://schemas.microsoft.com/office/drawing/2014/main" id="{E7A2E117-9F4E-4D19-81F4-0F75E99F34F7}"/>
+              </a:ext>
+            </a:extLst>
+          </p:cNvPr>
+          <p:cNvCxnSpPr>
+            <a:cxnSpLocks/>
+            <a:stCxn id="44" idx="1"/>
+          </p:cNvCxnSpPr>
+          <p:nvPr/>
+        </p:nvCxnSpPr>
+        <p:spPr>
+          <a:xfrm flipH="1" flipV="1">
+            <a:off x="8736366" y="4216257"/>
+            <a:ext cx="603364" cy="1129930"/>
+          </a:xfrm>
+          <a:prstGeom prst="straightConnector1">
+            <a:avLst/>
+          </a:prstGeom>
+          <a:ln>
+            <a:tailEnd type="triangle"/>
+          </a:ln>
+        </p:spPr>
+        <p:style>
+          <a:lnRef idx="1">
+            <a:schemeClr val="accent1"/>
+          </a:lnRef>
+          <a:fillRef idx="0">
+            <a:schemeClr val="accent1"/>
+          </a:fillRef>
+          <a:effectRef idx="0">
+            <a:schemeClr val="accent1"/>
+          </a:effectRef>
+          <a:fontRef idx="minor">
+            <a:schemeClr val="tx1"/>
+          </a:fontRef>
+        </p:style>
+      </p:cxnSp>
+      <p:cxnSp>
+        <p:nvCxnSpPr>
+          <p:cNvPr id="58" name="Egyenes összekötő nyíllal 57">
+            <a:extLst>
+              <a:ext uri="{FF2B5EF4-FFF2-40B4-BE49-F238E27FC236}">
+                <a16:creationId xmlns:a16="http://schemas.microsoft.com/office/drawing/2014/main" id="{BCD426FC-89F6-4AE6-9ADC-C5DAF6FEF7FB}"/>
+              </a:ext>
+            </a:extLst>
+          </p:cNvPr>
+          <p:cNvCxnSpPr>
+            <a:stCxn id="46" idx="2"/>
+            <a:endCxn id="43" idx="6"/>
+          </p:cNvCxnSpPr>
+          <p:nvPr/>
+        </p:nvCxnSpPr>
+        <p:spPr>
+          <a:xfrm flipH="1">
+            <a:off x="8785964" y="4082535"/>
+            <a:ext cx="1441619" cy="941007"/>
+          </a:xfrm>
+          <a:prstGeom prst="straightConnector1">
+            <a:avLst/>
+          </a:prstGeom>
+          <a:ln>
+            <a:tailEnd type="triangle"/>
+          </a:ln>
+        </p:spPr>
+        <p:style>
+          <a:lnRef idx="1">
+            <a:schemeClr val="accent1"/>
+          </a:lnRef>
+          <a:fillRef idx="0">
+            <a:schemeClr val="accent1"/>
+          </a:fillRef>
+          <a:effectRef idx="0">
+            <a:schemeClr val="accent1"/>
+          </a:effectRef>
+          <a:fontRef idx="minor">
+            <a:schemeClr val="tx1"/>
+          </a:fontRef>
+        </p:style>
+      </p:cxnSp>
+      <p:cxnSp>
+        <p:nvCxnSpPr>
+          <p:cNvPr id="60" name="Egyenes összekötő nyíllal 59">
+            <a:extLst>
+              <a:ext uri="{FF2B5EF4-FFF2-40B4-BE49-F238E27FC236}">
+                <a16:creationId xmlns:a16="http://schemas.microsoft.com/office/drawing/2014/main" id="{01DF418F-F661-4FED-BD46-754260453194}"/>
+              </a:ext>
+            </a:extLst>
+          </p:cNvPr>
+          <p:cNvCxnSpPr>
+            <a:stCxn id="43" idx="0"/>
+            <a:endCxn id="47" idx="4"/>
+          </p:cNvCxnSpPr>
+          <p:nvPr/>
+        </p:nvCxnSpPr>
+        <p:spPr>
+          <a:xfrm flipV="1">
+            <a:off x="8575017" y="4332787"/>
+            <a:ext cx="0" cy="480978"/>
+          </a:xfrm>
+          <a:prstGeom prst="straightConnector1">
+            <a:avLst/>
+          </a:prstGeom>
+          <a:ln>
+            <a:tailEnd type="triangle"/>
+          </a:ln>
+        </p:spPr>
+        <p:style>
+          <a:lnRef idx="1">
+            <a:schemeClr val="accent1"/>
+          </a:lnRef>
+          <a:fillRef idx="0">
+            <a:schemeClr val="accent1"/>
+          </a:fillRef>
+          <a:effectRef idx="0">
+            <a:schemeClr val="accent1"/>
+          </a:effectRef>
+          <a:fontRef idx="minor">
+            <a:schemeClr val="tx1"/>
+          </a:fontRef>
+        </p:style>
+      </p:cxnSp>
     </p:spTree>
     <p:extLst>
       <p:ext uri="{BB962C8B-B14F-4D97-AF65-F5344CB8AC3E}">
@@ -5018,8 +6507,8 @@
           </a:p>
         </p:txBody>
       </p:sp>
-      <mc:AlternateContent xmlns:mc="http://schemas.openxmlformats.org/markup-compatibility/2006">
-        <mc:Choice xmlns:a14="http://schemas.microsoft.com/office/drawing/2010/main" Requires="a14">
+      <mc:AlternateContent xmlns:mc="http://schemas.openxmlformats.org/markup-compatibility/2006" xmlns:a14="http://schemas.microsoft.com/office/drawing/2010/main">
+        <mc:Choice Requires="a14">
           <p:sp>
             <p:nvSpPr>
               <p:cNvPr id="3" name="Tartalom helye 2"/>
@@ -5521,7 +7010,7 @@
             </p:txBody>
           </p:sp>
         </mc:Choice>
-        <mc:Fallback>
+        <mc:Fallback xmlns="">
           <p:sp>
             <p:nvSpPr>
               <p:cNvPr id="3" name="Tartalom helye 2"/>
@@ -5621,8 +7110,8 @@
           </a:p>
         </p:txBody>
       </p:sp>
-      <mc:AlternateContent xmlns:mc="http://schemas.openxmlformats.org/markup-compatibility/2006">
-        <mc:Choice xmlns:a14="http://schemas.microsoft.com/office/drawing/2010/main" Requires="a14">
+      <mc:AlternateContent xmlns:mc="http://schemas.openxmlformats.org/markup-compatibility/2006" xmlns:a14="http://schemas.microsoft.com/office/drawing/2010/main">
+        <mc:Choice Requires="a14">
           <p:sp>
             <p:nvSpPr>
               <p:cNvPr id="3" name="Tartalom helye 2"/>
@@ -6061,7 +7550,7 @@
             </p:txBody>
           </p:sp>
         </mc:Choice>
-        <mc:Fallback>
+        <mc:Fallback xmlns="">
           <p:sp>
             <p:nvSpPr>
               <p:cNvPr id="3" name="Tartalom helye 2"/>
@@ -6188,8 +7677,8 @@
           </a:p>
         </p:txBody>
       </p:sp>
-      <mc:AlternateContent xmlns:mc="http://schemas.openxmlformats.org/markup-compatibility/2006">
-        <mc:Choice xmlns:a14="http://schemas.microsoft.com/office/drawing/2010/main" Requires="a14">
+      <mc:AlternateContent xmlns:mc="http://schemas.openxmlformats.org/markup-compatibility/2006" xmlns:a14="http://schemas.microsoft.com/office/drawing/2010/main">
+        <mc:Choice Requires="a14">
           <p:sp>
             <p:nvSpPr>
               <p:cNvPr id="3" name="Tartalom helye 2"/>
@@ -6723,7 +8212,7 @@
             </p:txBody>
           </p:sp>
         </mc:Choice>
-        <mc:Fallback>
+        <mc:Fallback xmlns="">
           <p:sp>
             <p:nvSpPr>
               <p:cNvPr id="3" name="Tartalom helye 2"/>
@@ -7499,8 +8988,8 @@
           </a:fontRef>
         </p:style>
       </p:cxnSp>
-      <mc:AlternateContent xmlns:mc="http://schemas.openxmlformats.org/markup-compatibility/2006">
-        <mc:Choice xmlns:a14="http://schemas.microsoft.com/office/drawing/2010/main" Requires="a14">
+      <mc:AlternateContent xmlns:mc="http://schemas.openxmlformats.org/markup-compatibility/2006" xmlns:a14="http://schemas.microsoft.com/office/drawing/2010/main">
+        <mc:Choice Requires="a14">
           <p:sp>
             <p:nvSpPr>
               <p:cNvPr id="49" name="Szövegdoboz 48">
@@ -7745,7 +9234,7 @@
             </p:txBody>
           </p:sp>
         </mc:Choice>
-        <mc:Fallback>
+        <mc:Fallback xmlns="">
           <p:sp>
             <p:nvSpPr>
               <p:cNvPr id="49" name="Szövegdoboz 48">
@@ -8536,8 +10025,8 @@
           </a:fontRef>
         </p:style>
       </p:cxnSp>
-      <mc:AlternateContent xmlns:mc="http://schemas.openxmlformats.org/markup-compatibility/2006">
-        <mc:Choice xmlns:a14="http://schemas.microsoft.com/office/drawing/2010/main" Requires="a14">
+      <mc:AlternateContent xmlns:mc="http://schemas.openxmlformats.org/markup-compatibility/2006" xmlns:a14="http://schemas.microsoft.com/office/drawing/2010/main">
+        <mc:Choice Requires="a14">
           <p:sp>
             <p:nvSpPr>
               <p:cNvPr id="49" name="Szövegdoboz 48">
@@ -8813,7 +10302,7 @@
             </p:txBody>
           </p:sp>
         </mc:Choice>
-        <mc:Fallback>
+        <mc:Fallback xmlns="">
           <p:sp>
             <p:nvSpPr>
               <p:cNvPr id="49" name="Szövegdoboz 48">
@@ -9604,8 +11093,8 @@
           </a:fontRef>
         </p:style>
       </p:cxnSp>
-      <mc:AlternateContent xmlns:mc="http://schemas.openxmlformats.org/markup-compatibility/2006">
-        <mc:Choice xmlns:a14="http://schemas.microsoft.com/office/drawing/2010/main" Requires="a14">
+      <mc:AlternateContent xmlns:mc="http://schemas.openxmlformats.org/markup-compatibility/2006" xmlns:a14="http://schemas.microsoft.com/office/drawing/2010/main">
+        <mc:Choice Requires="a14">
           <p:sp>
             <p:nvSpPr>
               <p:cNvPr id="19" name="Szövegdoboz 18">
@@ -9943,7 +11432,7 @@
             </p:txBody>
           </p:sp>
         </mc:Choice>
-        <mc:Fallback>
+        <mc:Fallback xmlns="">
           <p:sp>
             <p:nvSpPr>
               <p:cNvPr id="19" name="Szövegdoboz 18">
@@ -10548,8 +12037,8 @@
           </a:p>
         </p:txBody>
       </p:sp>
-      <mc:AlternateContent xmlns:mc="http://schemas.openxmlformats.org/markup-compatibility/2006">
-        <mc:Choice xmlns:a14="http://schemas.microsoft.com/office/drawing/2010/main" Requires="a14">
+      <mc:AlternateContent xmlns:mc="http://schemas.openxmlformats.org/markup-compatibility/2006" xmlns:a14="http://schemas.microsoft.com/office/drawing/2010/main">
+        <mc:Choice Requires="a14">
           <p:sp>
             <p:nvSpPr>
               <p:cNvPr id="3" name="Content Placeholder 2"/>
@@ -10744,7 +12233,7 @@
             </p:txBody>
           </p:sp>
         </mc:Choice>
-        <mc:Fallback>
+        <mc:Fallback xmlns="">
           <p:sp>
             <p:nvSpPr>
               <p:cNvPr id="3" name="Content Placeholder 2"/>
@@ -11044,18 +12533,21 @@
                   <a:rPr lang="hu-HU" dirty="0" err="1"/>
                   <a:t>load</a:t>
                 </a:r>
-                <a:r>
-                  <a:rPr lang="hu-HU" dirty="0"/>
-                  <a:t> </a:t>
-                </a:r>
                 <a14:m>
                   <m:oMath xmlns:m="http://schemas.openxmlformats.org/officeDocument/2006/math">
+                    <m:r>
+                      <a:rPr lang="hu-HU" b="0" i="0" smtClean="0">
+                        <a:latin typeface="Cambria Math" panose="02040503050406030204" pitchFamily="18" charset="0"/>
+                        <a:ea typeface="Cambria Math" panose="02040503050406030204" pitchFamily="18" charset="0"/>
+                      </a:rPr>
+                      <m:t> </m:t>
+                    </m:r>
                     <m:r>
                       <a:rPr lang="hu-HU" i="1">
                         <a:latin typeface="Cambria Math" panose="02040503050406030204" pitchFamily="18" charset="0"/>
                         <a:ea typeface="Cambria Math" panose="02040503050406030204" pitchFamily="18" charset="0"/>
                       </a:rPr>
-                      <m:t>𝜃</m:t>
+                      <m:t>𝜙</m:t>
                     </m:r>
                   </m:oMath>
                 </a14:m>

</xml_diff>

<commit_message>
Add some details to problem statement model
</commit_message>
<xml_diff>
--- a/halozatok/Load-Optimal Local Fast Rerouting for Relisient Networks.pptx
+++ b/halozatok/Load-Optimal Local Fast Rerouting for Relisient Networks.pptx
@@ -13007,7 +13007,7 @@
             </a:r>
             <a:r>
               <a:rPr lang="hu-HU" dirty="0" err="1"/>
-              <a:t>mutiple</a:t>
+              <a:t>multiple</a:t>
             </a:r>
             <a:r>
               <a:rPr lang="hu-HU" dirty="0"/>
@@ -13289,14 +13289,33 @@
                           <a:rPr lang="hu-HU" b="0" i="1" smtClean="0">
                             <a:latin typeface="Cambria Math" panose="02040503050406030204" pitchFamily="18" charset="0"/>
                           </a:rPr>
-                          <m:t>, .. , </m:t>
+                          <m:t>, .. ,</m:t>
                         </m:r>
-                        <m:r>
-                          <a:rPr lang="hu-HU" b="0" i="1" smtClean="0">
-                            <a:latin typeface="Cambria Math" panose="02040503050406030204" pitchFamily="18" charset="0"/>
-                          </a:rPr>
-                          <m:t>𝑣𝑛</m:t>
-                        </m:r>
+                        <m:sSub>
+                          <m:sSubPr>
+                            <m:ctrlPr>
+                              <a:rPr lang="hu-HU" b="0" i="1" smtClean="0">
+                                <a:latin typeface="Cambria Math" panose="02040503050406030204" pitchFamily="18" charset="0"/>
+                              </a:rPr>
+                            </m:ctrlPr>
+                          </m:sSubPr>
+                          <m:e>
+                            <m:r>
+                              <a:rPr lang="hu-HU" b="0" i="1" smtClean="0">
+                                <a:latin typeface="Cambria Math" panose="02040503050406030204" pitchFamily="18" charset="0"/>
+                              </a:rPr>
+                              <m:t>𝑣</m:t>
+                            </m:r>
+                          </m:e>
+                          <m:sub>
+                            <m:r>
+                              <a:rPr lang="hu-HU" b="0" i="1" smtClean="0">
+                                <a:latin typeface="Cambria Math" panose="02040503050406030204" pitchFamily="18" charset="0"/>
+                              </a:rPr>
+                              <m:t>𝑛</m:t>
+                            </m:r>
+                          </m:sub>
+                        </m:sSub>
                       </m:e>
                     </m:d>
                   </m:oMath>
@@ -13308,8 +13327,36 @@
               </a:p>
               <a:p>
                 <a:r>
+                  <a:rPr lang="hu-HU" dirty="0" err="1"/>
+                  <a:t>Each</a:t>
+                </a:r>
+                <a:r>
                   <a:rPr lang="hu-HU" dirty="0"/>
-                  <a:t>2 flow </a:t>
+                  <a:t> </a:t>
+                </a:r>
+                <a:r>
+                  <a:rPr lang="hu-HU" dirty="0" err="1"/>
+                  <a:t>node</a:t>
+                </a:r>
+                <a:r>
+                  <a:rPr lang="hu-HU" dirty="0"/>
+                  <a:t> has 2 </a:t>
+                </a:r>
+                <a:r>
+                  <a:rPr lang="hu-HU" dirty="0" err="1"/>
+                  <a:t>kinds</a:t>
+                </a:r>
+                <a:r>
+                  <a:rPr lang="hu-HU" dirty="0"/>
+                  <a:t> of </a:t>
+                </a:r>
+                <a:r>
+                  <a:rPr lang="hu-HU" dirty="0" err="1"/>
+                  <a:t>static</a:t>
+                </a:r>
+                <a:r>
+                  <a:rPr lang="hu-HU" dirty="0"/>
+                  <a:t> flow </a:t>
                 </a:r>
                 <a:r>
                   <a:rPr lang="hu-HU" dirty="0" err="1"/>
@@ -13317,7 +13364,18 @@
                 </a:r>
                 <a:r>
                   <a:rPr lang="hu-HU" dirty="0"/>
-                  <a:t>: original (</a:t>
+                  <a:t>: </a:t>
+                </a:r>
+              </a:p>
+              <a:p>
+                <a:pPr lvl="1"/>
+                <a:r>
+                  <a:rPr lang="hu-HU" dirty="0" err="1"/>
+                  <a:t>original</a:t>
+                </a:r>
+                <a:r>
+                  <a:rPr lang="hu-HU" dirty="0"/>
+                  <a:t> (</a:t>
                 </a:r>
                 <a:r>
                   <a:rPr lang="hu-HU" dirty="0" err="1"/>
@@ -13333,7 +13391,26 @@
                 </a:r>
                 <a:r>
                   <a:rPr lang="hu-HU" dirty="0"/>
-                  <a:t> behavior) and conditional (in case of node fail)</a:t>
+                  <a:t> </a:t>
+                </a:r>
+                <a:r>
+                  <a:rPr lang="hu-HU" dirty="0" err="1"/>
+                  <a:t>behavior</a:t>
+                </a:r>
+                <a:r>
+                  <a:rPr lang="hu-HU" dirty="0"/>
+                  <a:t>)</a:t>
+                </a:r>
+              </a:p>
+              <a:p>
+                <a:pPr lvl="1"/>
+                <a:r>
+                  <a:rPr lang="hu-HU" dirty="0" err="1"/>
+                  <a:t>conditional</a:t>
+                </a:r>
+                <a:r>
+                  <a:rPr lang="hu-HU" dirty="0"/>
+                  <a:t> (in case of node fail)</a:t>
                 </a:r>
               </a:p>
               <a:p>
@@ -13372,7 +13449,7 @@
               <a:blipFill>
                 <a:blip r:embed="rId2"/>
                 <a:stretch>
-                  <a:fillRect l="-1043" t="-2241" r="-1333"/>
+                  <a:fillRect l="-1043" t="-2241" r="-696"/>
                 </a:stretch>
               </a:blipFill>
             </p:spPr>
@@ -13497,7 +13574,23 @@
                 </a14:m>
                 <a:r>
                   <a:rPr lang="hu-HU" dirty="0"/>
-                  <a:t> is a number of </a:t>
+                  <a:t> is </a:t>
+                </a:r>
+                <a:r>
+                  <a:rPr lang="hu-HU" dirty="0" err="1"/>
+                  <a:t>the</a:t>
+                </a:r>
+                <a:r>
+                  <a:rPr lang="hu-HU" dirty="0"/>
+                  <a:t> </a:t>
+                </a:r>
+                <a:r>
+                  <a:rPr lang="hu-HU" dirty="0" err="1"/>
+                  <a:t>number</a:t>
+                </a:r>
+                <a:r>
+                  <a:rPr lang="hu-HU" dirty="0"/>
+                  <a:t> of flows </a:t>
                 </a:r>
                 <a:r>
                   <a:rPr lang="hu-HU" dirty="0" err="1"/>
@@ -13505,7 +13598,7 @@
                 </a:r>
                 <a:r>
                   <a:rPr lang="hu-HU" dirty="0"/>
-                  <a:t> flows considering an e edge </a:t>
+                  <a:t> e edge </a:t>
                 </a:r>
                 <a:r>
                   <a:rPr lang="hu-HU" dirty="0" err="1"/>
@@ -13533,6 +13626,18 @@
                 </a:r>
               </a:p>
               <a:p>
+                <a:r>
+                  <a:rPr lang="hu-HU" dirty="0" err="1">
+                    <a:ea typeface="Cambria Math" panose="02040503050406030204" pitchFamily="18" charset="0"/>
+                  </a:rPr>
+                  <a:t>Let</a:t>
+                </a:r>
+                <a:r>
+                  <a:rPr lang="hu-HU" dirty="0">
+                    <a:ea typeface="Cambria Math" panose="02040503050406030204" pitchFamily="18" charset="0"/>
+                  </a:rPr>
+                  <a:t> </a:t>
+                </a:r>
                 <a14:m>
                   <m:oMath xmlns:m="http://schemas.openxmlformats.org/officeDocument/2006/math">
                     <m:r>
@@ -13620,6 +13725,9 @@
                   <a:rPr lang="hu-HU" dirty="0"/>
                   <a:t>: </a:t>
                 </a:r>
+              </a:p>
+              <a:p>
+                <a:pPr lvl="1"/>
                 <a14:m>
                   <m:oMath xmlns:m="http://schemas.openxmlformats.org/officeDocument/2006/math">
                     <m:r>
@@ -13641,8 +13749,50 @@
                       </a:rPr>
                       <m:t>𝐸</m:t>
                     </m:r>
+                    <m:r>
+                      <a:rPr lang="hu-HU" b="0" i="1" smtClean="0">
+                        <a:latin typeface="Cambria Math" panose="02040503050406030204" pitchFamily="18" charset="0"/>
+                        <a:ea typeface="Cambria Math" panose="02040503050406030204" pitchFamily="18" charset="0"/>
+                      </a:rPr>
+                      <m:t>.</m:t>
+                    </m:r>
                   </m:oMath>
                 </a14:m>
+                <a:r>
+                  <a:rPr lang="hu-HU" dirty="0"/>
+                  <a:t> </a:t>
+                </a:r>
+              </a:p>
+              <a:p>
+                <a:pPr lvl="1"/>
+                <a:r>
+                  <a:rPr lang="hu-HU" dirty="0" err="1"/>
+                  <a:t>Choose</a:t>
+                </a:r>
+                <a:r>
+                  <a:rPr lang="hu-HU" dirty="0"/>
+                  <a:t> </a:t>
+                </a:r>
+                <a:r>
+                  <a:rPr lang="hu-HU" dirty="0" err="1"/>
+                  <a:t>some</a:t>
+                </a:r>
+                <a:r>
+                  <a:rPr lang="hu-HU" dirty="0"/>
+                  <a:t> </a:t>
+                </a:r>
+                <a:r>
+                  <a:rPr lang="hu-HU" dirty="0" err="1"/>
+                  <a:t>failing</a:t>
+                </a:r>
+                <a:r>
+                  <a:rPr lang="hu-HU" dirty="0"/>
+                  <a:t> </a:t>
+                </a:r>
+                <a:r>
+                  <a:rPr lang="hu-HU" dirty="0" err="1"/>
+                  <a:t>links</a:t>
+                </a:r>
                 <a:r>
                   <a:rPr lang="hu-HU" dirty="0"/>
                   <a:t> </a:t>
@@ -13713,6 +13863,12 @@
                   <a:rPr lang="hu-HU" dirty="0"/>
                   <a:t>. </a:t>
                 </a:r>
+                <a:endParaRPr lang="hu-HU" b="0" i="1" dirty="0">
+                  <a:latin typeface="Cambria Math" panose="02040503050406030204" pitchFamily="18" charset="0"/>
+                </a:endParaRPr>
+              </a:p>
+              <a:p>
+                <a:pPr lvl="1"/>
                 <a14:m>
                   <m:oMath xmlns:m="http://schemas.openxmlformats.org/officeDocument/2006/math">
                     <m:r>
@@ -13762,7 +13918,15 @@
                 </a:r>
                 <a:r>
                   <a:rPr lang="hu-HU" dirty="0" err="1"/>
-                  <a:t>minimal</a:t>
+                  <a:t>set</a:t>
+                </a:r>
+                <a:r>
+                  <a:rPr lang="hu-HU" dirty="0"/>
+                  <a:t> of </a:t>
+                </a:r>
+                <a:r>
+                  <a:rPr lang="hu-HU" dirty="0" err="1"/>
+                  <a:t>optimal</a:t>
                 </a:r>
                 <a:r>
                   <a:rPr lang="hu-HU" dirty="0"/>
@@ -13770,7 +13934,15 @@
                 </a:r>
                 <a:r>
                   <a:rPr lang="hu-HU" dirty="0" err="1"/>
-                  <a:t>required</a:t>
+                  <a:t>attacks</a:t>
+                </a:r>
+                <a:r>
+                  <a:rPr lang="hu-HU" dirty="0"/>
+                  <a:t>: </a:t>
+                </a:r>
+                <a:r>
+                  <a:rPr lang="hu-HU" dirty="0" err="1"/>
+                  <a:t>minimal</a:t>
                 </a:r>
                 <a:r>
                   <a:rPr lang="hu-HU" dirty="0"/>
@@ -13778,11 +13950,11 @@
                 </a:r>
                 <a:r>
                   <a:rPr lang="hu-HU" dirty="0" err="1"/>
-                  <a:t>set</a:t>
+                  <a:t>required</a:t>
                 </a:r>
                 <a:r>
                   <a:rPr lang="hu-HU" dirty="0"/>
-                  <a:t> of </a:t>
+                  <a:t> </a:t>
                 </a:r>
                 <a:r>
                   <a:rPr lang="hu-HU" dirty="0" err="1"/>
@@ -13838,7 +14010,10 @@
                     </m:r>
                   </m:oMath>
                 </a14:m>
-                <a:endParaRPr lang="hu-HU" dirty="0"/>
+                <a:r>
+                  <a:rPr lang="hu-HU" dirty="0"/>
+                  <a:t>.</a:t>
+                </a:r>
               </a:p>
             </p:txBody>
           </p:sp>
@@ -13964,7 +14139,7 @@
           <a:p>
             <a:r>
               <a:rPr lang="hu-HU" dirty="0" err="1"/>
-              <a:t>Using</a:t>
+              <a:t>We</a:t>
             </a:r>
             <a:r>
               <a:rPr lang="hu-HU" dirty="0"/>
@@ -13972,7 +14147,7 @@
             </a:r>
             <a:r>
               <a:rPr lang="hu-HU" dirty="0" err="1"/>
-              <a:t>All-to</a:t>
+              <a:t>consider</a:t>
             </a:r>
             <a:r>
               <a:rPr lang="hu-HU" dirty="0"/>
@@ -13980,7 +14155,7 @@
             </a:r>
             <a:r>
               <a:rPr lang="hu-HU" dirty="0" err="1"/>
-              <a:t>One</a:t>
+              <a:t>All-to</a:t>
             </a:r>
             <a:r>
               <a:rPr lang="hu-HU" dirty="0"/>
@@ -13988,7 +14163,15 @@
             </a:r>
             <a:r>
               <a:rPr lang="hu-HU" dirty="0" err="1"/>
-              <a:t>routing</a:t>
+              <a:t>One</a:t>
+            </a:r>
+            <a:r>
+              <a:rPr lang="hu-HU" dirty="0"/>
+              <a:t> </a:t>
+            </a:r>
+            <a:r>
+              <a:rPr lang="hu-HU" dirty="0" err="1"/>
+              <a:t>communication</a:t>
             </a:r>
             <a:endParaRPr lang="hu-HU" dirty="0"/>
           </a:p>

</xml_diff>

<commit_message>
Add some more details to permutation routing
</commit_message>
<xml_diff>
--- a/halozatok/Load-Optimal Local Fast Rerouting for Relisient Networks.pptx
+++ b/halozatok/Load-Optimal Local Fast Rerouting for Relisient Networks.pptx
@@ -12470,6 +12470,84 @@
               <a:p>
                 <a:r>
                   <a:rPr lang="hu-HU" dirty="0" err="1"/>
+                  <a:t>Need</a:t>
+                </a:r>
+                <a:r>
+                  <a:rPr lang="hu-HU" dirty="0"/>
+                  <a:t> backup </a:t>
+                </a:r>
+                <a:r>
+                  <a:rPr lang="hu-HU" dirty="0" err="1"/>
+                  <a:t>sequences</a:t>
+                </a:r>
+                <a:r>
+                  <a:rPr lang="hu-HU" dirty="0"/>
+                  <a:t> </a:t>
+                </a:r>
+                <a:r>
+                  <a:rPr lang="hu-HU" dirty="0" err="1"/>
+                  <a:t>to</a:t>
+                </a:r>
+                <a:r>
+                  <a:rPr lang="hu-HU" dirty="0"/>
+                  <a:t> </a:t>
+                </a:r>
+                <a:r>
+                  <a:rPr lang="hu-HU" dirty="0" err="1"/>
+                  <a:t>reach</a:t>
+                </a:r>
+                <a:r>
+                  <a:rPr lang="hu-HU" dirty="0"/>
+                  <a:t> </a:t>
+                </a:r>
+                <a:r>
+                  <a:rPr lang="hu-HU" dirty="0" err="1"/>
+                  <a:t>destination</a:t>
+                </a:r>
+                <a:r>
+                  <a:rPr lang="hu-HU" dirty="0"/>
+                  <a:t> </a:t>
+                </a:r>
+                <a14:m>
+                  <m:oMath xmlns:m="http://schemas.openxmlformats.org/officeDocument/2006/math">
+                    <m:r>
+                      <a:rPr lang="hu-HU" i="1">
+                        <a:latin typeface="Cambria Math" panose="02040503050406030204" pitchFamily="18" charset="0"/>
+                        <a:ea typeface="Cambria Math" panose="02040503050406030204" pitchFamily="18" charset="0"/>
+                      </a:rPr>
+                      <m:t>𝜋</m:t>
+                    </m:r>
+                    <m:r>
+                      <a:rPr lang="hu-HU" i="1">
+                        <a:latin typeface="Cambria Math" panose="02040503050406030204" pitchFamily="18" charset="0"/>
+                        <a:ea typeface="Cambria Math" panose="02040503050406030204" pitchFamily="18" charset="0"/>
+                      </a:rPr>
+                      <m:t>(</m:t>
+                    </m:r>
+                    <m:r>
+                      <a:rPr lang="hu-HU" i="1">
+                        <a:latin typeface="Cambria Math" panose="02040503050406030204" pitchFamily="18" charset="0"/>
+                        <a:ea typeface="Cambria Math" panose="02040503050406030204" pitchFamily="18" charset="0"/>
+                      </a:rPr>
+                      <m:t>𝑣</m:t>
+                    </m:r>
+                    <m:r>
+                      <a:rPr lang="hu-HU" i="1">
+                        <a:latin typeface="Cambria Math" panose="02040503050406030204" pitchFamily="18" charset="0"/>
+                        <a:ea typeface="Cambria Math" panose="02040503050406030204" pitchFamily="18" charset="0"/>
+                      </a:rPr>
+                      <m:t>)</m:t>
+                    </m:r>
+                  </m:oMath>
+                </a14:m>
+                <a:r>
+                  <a:rPr lang="hu-HU" dirty="0"/>
+                  <a:t>.</a:t>
+                </a:r>
+              </a:p>
+              <a:p>
+                <a:r>
+                  <a:rPr lang="hu-HU" dirty="0" err="1"/>
                   <a:t>With</a:t>
                 </a:r>
                 <a:r>
@@ -12707,6 +12785,14 @@
             <a:r>
               <a:rPr lang="hu-HU" dirty="0" err="1"/>
               <a:t>Arbitrary</a:t>
+            </a:r>
+            <a:r>
+              <a:rPr lang="hu-HU" dirty="0"/>
+              <a:t> </a:t>
+            </a:r>
+            <a:r>
+              <a:rPr lang="hu-HU" dirty="0" err="1"/>
+              <a:t>traffic</a:t>
             </a:r>
             <a:r>
               <a:rPr lang="hu-HU" dirty="0"/>
@@ -14178,11 +14264,93 @@
           <a:p>
             <a:r>
               <a:rPr lang="hu-HU" dirty="0"/>
-              <a:t>n flow, n </a:t>
+              <a:t>n flows </a:t>
             </a:r>
             <a:r>
               <a:rPr lang="hu-HU" dirty="0" err="1"/>
-              <a:t>node</a:t>
+              <a:t>routed</a:t>
+            </a:r>
+            <a:r>
+              <a:rPr lang="hu-HU" dirty="0"/>
+              <a:t> </a:t>
+            </a:r>
+            <a:r>
+              <a:rPr lang="hu-HU" dirty="0" err="1"/>
+              <a:t>on</a:t>
+            </a:r>
+            <a:r>
+              <a:rPr lang="hu-HU" dirty="0"/>
+              <a:t> </a:t>
+            </a:r>
+            <a:r>
+              <a:rPr lang="hu-HU" dirty="0" err="1"/>
+              <a:t>the</a:t>
+            </a:r>
+            <a:r>
+              <a:rPr lang="hu-HU" dirty="0"/>
+              <a:t> </a:t>
+            </a:r>
+            <a:r>
+              <a:rPr lang="hu-HU" dirty="0" err="1"/>
+              <a:t>network</a:t>
+            </a:r>
+            <a:r>
+              <a:rPr lang="hu-HU" dirty="0"/>
+              <a:t> (</a:t>
+            </a:r>
+            <a:r>
+              <a:rPr lang="hu-HU" dirty="0" err="1"/>
+              <a:t>represented</a:t>
+            </a:r>
+            <a:r>
+              <a:rPr lang="hu-HU" dirty="0"/>
+              <a:t> </a:t>
+            </a:r>
+            <a:r>
+              <a:rPr lang="hu-HU" dirty="0" err="1"/>
+              <a:t>by</a:t>
+            </a:r>
+            <a:r>
+              <a:rPr lang="hu-HU" dirty="0"/>
+              <a:t> (</a:t>
+            </a:r>
+            <a:r>
+              <a:rPr lang="hu-HU" dirty="0" err="1"/>
+              <a:t>s</a:t>
+            </a:r>
+            <a:r>
+              <a:rPr lang="hu-HU" baseline="-25000" dirty="0" err="1"/>
+              <a:t>i</a:t>
+            </a:r>
+            <a:r>
+              <a:rPr lang="hu-HU" dirty="0" err="1"/>
+              <a:t>,d</a:t>
+            </a:r>
+            <a:r>
+              <a:rPr lang="hu-HU" baseline="-25000" dirty="0" err="1"/>
+              <a:t>i</a:t>
+            </a:r>
+            <a:r>
+              <a:rPr lang="hu-HU" dirty="0"/>
+              <a:t>) </a:t>
+            </a:r>
+            <a:r>
+              <a:rPr lang="hu-HU" dirty="0" err="1"/>
+              <a:t>pairs</a:t>
+            </a:r>
+            <a:r>
+              <a:rPr lang="hu-HU" dirty="0"/>
+              <a:t>), </a:t>
+            </a:r>
+          </a:p>
+          <a:p>
+            <a:r>
+              <a:rPr lang="hu-HU" dirty="0"/>
+              <a:t>n </a:t>
+            </a:r>
+            <a:r>
+              <a:rPr lang="hu-HU" dirty="0" err="1"/>
+              <a:t>nodes</a:t>
             </a:r>
             <a:endParaRPr lang="hu-HU" dirty="0"/>
           </a:p>
@@ -14247,7 +14415,15 @@
             </a:r>
             <a:r>
               <a:rPr lang="hu-HU" dirty="0"/>
-              <a:t> flow </a:t>
+              <a:t> </a:t>
+            </a:r>
+            <a:r>
+              <a:rPr lang="hu-HU" dirty="0" err="1"/>
+              <a:t>row</a:t>
+            </a:r>
+            <a:r>
+              <a:rPr lang="hu-HU" dirty="0"/>
+              <a:t> </a:t>
             </a:r>
             <a:r>
               <a:rPr lang="hu-HU" dirty="0" err="1"/>
@@ -14275,7 +14451,7 @@
             </a:r>
             <a:r>
               <a:rPr lang="hu-HU" dirty="0" err="1"/>
-              <a:t>foward</a:t>
+              <a:t>forward</a:t>
             </a:r>
             <a:r>
               <a:rPr lang="hu-HU" dirty="0"/>
@@ -14319,11 +14495,19 @@
             </a:r>
             <a:r>
               <a:rPr lang="hu-HU" baseline="-25000" dirty="0"/>
-              <a:t>i</a:t>
+              <a:t>i </a:t>
             </a:r>
             <a:r>
               <a:rPr lang="hu-HU" dirty="0"/>
-              <a:t>. </a:t>
+              <a:t>(</a:t>
+            </a:r>
+            <a:r>
+              <a:rPr lang="hu-HU" dirty="0" err="1"/>
+              <a:t>ith</a:t>
+            </a:r>
+            <a:r>
+              <a:rPr lang="hu-HU" dirty="0"/>
+              <a:t> flow). </a:t>
             </a:r>
             <a:r>
               <a:rPr lang="hu-HU" dirty="0" err="1"/>
@@ -14395,7 +14579,15 @@
             </a:r>
             <a:r>
               <a:rPr lang="hu-HU" dirty="0"/>
-              <a:t> flow </a:t>
+              <a:t> </a:t>
+            </a:r>
+            <a:r>
+              <a:rPr lang="hu-HU" dirty="0" err="1"/>
+              <a:t>row</a:t>
+            </a:r>
+            <a:r>
+              <a:rPr lang="hu-HU" dirty="0"/>
+              <a:t> </a:t>
             </a:r>
             <a:r>
               <a:rPr lang="hu-HU" dirty="0" err="1"/>

</xml_diff>